<commit_message>
Update slides: Add referene to EIP-7745
</commit_message>
<xml_diff>
--- a/slides.pptx
+++ b/slides.pptx
@@ -22304,7 +22304,7 @@
             <a:pPr algn="ctr"/>
             <a:r>
               <a:rPr lang="en-CH" dirty="0"/>
-              <a:t>Block root</a:t>
+              <a:t>Block number</a:t>
             </a:r>
           </a:p>
         </p:txBody>
@@ -22491,7 +22491,7 @@
             <a:pPr algn="ctr"/>
             <a:r>
               <a:rPr lang="en-CH" dirty="0"/>
-              <a:t>Tx root</a:t>
+              <a:t>Tx index</a:t>
             </a:r>
           </a:p>
         </p:txBody>
@@ -23453,6 +23453,58 @@
               <a:rPr lang="en-CH" sz="2000" dirty="0"/>
               <a:t>Fetchable with eth_getProof</a:t>
             </a:r>
+          </a:p>
+        </p:txBody>
+      </p:sp>
+      <p:sp>
+        <p:nvSpPr>
+          <p:cNvPr id="4" name="Cloud 3">
+            <a:extLst>
+              <a:ext uri="{FF2B5EF4-FFF2-40B4-BE49-F238E27FC236}">
+                <a16:creationId xmlns:a16="http://schemas.microsoft.com/office/drawing/2014/main" id="{D5A3CC9F-725F-2460-B840-49A7A6780CCF}"/>
+              </a:ext>
+            </a:extLst>
+          </p:cNvPr>
+          <p:cNvSpPr/>
+          <p:nvPr/>
+        </p:nvSpPr>
+        <p:spPr>
+          <a:xfrm>
+            <a:off x="7574220" y="618016"/>
+            <a:ext cx="4335403" cy="1006998"/>
+          </a:xfrm>
+          <a:prstGeom prst="cloud">
+            <a:avLst/>
+          </a:prstGeom>
+        </p:spPr>
+        <p:style>
+          <a:lnRef idx="2">
+            <a:schemeClr val="accent1"/>
+          </a:lnRef>
+          <a:fillRef idx="1">
+            <a:schemeClr val="lt1"/>
+          </a:fillRef>
+          <a:effectRef idx="0">
+            <a:schemeClr val="accent1"/>
+          </a:effectRef>
+          <a:fontRef idx="minor">
+            <a:schemeClr val="dk1"/>
+          </a:fontRef>
+        </p:style>
+        <p:txBody>
+          <a:bodyPr rtlCol="0" anchor="ctr"/>
+          <a:lstStyle/>
+          <a:p>
+            <a:pPr algn="ctr"/>
+            <a:r>
+              <a:rPr lang="en-CH" dirty="0"/>
+              <a:t>EIP-7745: </a:t>
+            </a:r>
+            <a:r>
+              <a:rPr lang="en-GB" dirty="0"/>
+              <a:t>Two dimensional log filter data structure</a:t>
+            </a:r>
+            <a:endParaRPr lang="en-CH" dirty="0"/>
           </a:p>
         </p:txBody>
       </p:sp>

</xml_diff>

<commit_message>
Update slides: Add ecrecover note and fix formatting on EIP-7745
</commit_message>
<xml_diff>
--- a/slides.pptx
+++ b/slides.pptx
@@ -7560,9 +7560,9 @@
           <a:gradFill>
             <a:gsLst>
               <a:gs pos="20000">
-                <a:schemeClr val="accent6">
-                  <a:lumMod val="40000"/>
-                  <a:lumOff val="60000"/>
+                <a:schemeClr val="tx2">
+                  <a:lumMod val="25000"/>
+                  <a:lumOff val="75000"/>
                 </a:schemeClr>
               </a:gs>
               <a:gs pos="100000">
@@ -7596,7 +7596,7 @@
           <a:lstStyle/>
           <a:p>
             <a:pPr algn="ctr"/>
-            <a:endParaRPr lang="en-CH"/>
+            <a:endParaRPr lang="en-CH" dirty="0"/>
           </a:p>
         </p:txBody>
       </p:sp>
@@ -8298,6 +8298,41 @@
           </a:fontRef>
         </p:style>
       </p:cxnSp>
+      <p:sp>
+        <p:nvSpPr>
+          <p:cNvPr id="4" name="TextBox 3">
+            <a:extLst>
+              <a:ext uri="{FF2B5EF4-FFF2-40B4-BE49-F238E27FC236}">
+                <a16:creationId xmlns:a16="http://schemas.microsoft.com/office/drawing/2014/main" id="{6C159658-F56D-D42A-123C-9CA75026CFC9}"/>
+              </a:ext>
+            </a:extLst>
+          </p:cNvPr>
+          <p:cNvSpPr txBox="1"/>
+          <p:nvPr/>
+        </p:nvSpPr>
+        <p:spPr>
+          <a:xfrm>
+            <a:off x="8684914" y="5105060"/>
+            <a:ext cx="1172116" cy="369332"/>
+          </a:xfrm>
+          <a:prstGeom prst="rect">
+            <a:avLst/>
+          </a:prstGeom>
+          <a:noFill/>
+        </p:spPr>
+        <p:txBody>
+          <a:bodyPr wrap="none" rtlCol="0">
+            <a:spAutoFit/>
+          </a:bodyPr>
+          <a:lstStyle/>
+          <a:p>
+            <a:r>
+              <a:rPr lang="en-CH" dirty="0"/>
+              <a:t>ecrecover</a:t>
+            </a:r>
+          </a:p>
+        </p:txBody>
+      </p:sp>
     </p:spTree>
     <p:extLst>
       <p:ext uri="{BB962C8B-B14F-4D97-AF65-F5344CB8AC3E}">
@@ -23470,8 +23505,8 @@
         </p:nvSpPr>
         <p:spPr>
           <a:xfrm>
-            <a:off x="7574220" y="618016"/>
-            <a:ext cx="4335403" cy="1006998"/>
+            <a:off x="7268902" y="618016"/>
+            <a:ext cx="4640722" cy="1006998"/>
           </a:xfrm>
           <a:prstGeom prst="cloud">
             <a:avLst/>

</xml_diff>

<commit_message>
Update slide title to include light clients / ssz
</commit_message>
<xml_diff>
--- a/slides.pptx
+++ b/slides.pptx
@@ -6406,6 +6406,13 @@
             <a:r>
               <a:rPr lang="en-CH" dirty="0"/>
               <a:t>Verifying wallets</a:t>
+            </a:r>
+            <a:br>
+              <a:rPr lang="en-CH" dirty="0"/>
+            </a:br>
+            <a:r>
+              <a:rPr lang="en-CH" dirty="0"/>
+              <a:t>Light clients and SSZ</a:t>
             </a:r>
           </a:p>
         </p:txBody>

</xml_diff>